<commit_message>
Updated slides week 1
</commit_message>
<xml_diff>
--- a/slides/intro.pptx
+++ b/slides/intro.pptx
@@ -7,26 +7,27 @@
   <p:sldIdLst>
     <p:sldId id="256" r:id="rId2"/>
     <p:sldId id="257" r:id="rId3"/>
-    <p:sldId id="258" r:id="rId4"/>
-    <p:sldId id="259" r:id="rId5"/>
-    <p:sldId id="260" r:id="rId6"/>
-    <p:sldId id="261" r:id="rId7"/>
-    <p:sldId id="262" r:id="rId8"/>
-    <p:sldId id="263" r:id="rId9"/>
-    <p:sldId id="264" r:id="rId10"/>
-    <p:sldId id="265" r:id="rId11"/>
-    <p:sldId id="266" r:id="rId12"/>
-    <p:sldId id="267" r:id="rId13"/>
-    <p:sldId id="269" r:id="rId14"/>
-    <p:sldId id="268" r:id="rId15"/>
-    <p:sldId id="275" r:id="rId16"/>
-    <p:sldId id="273" r:id="rId17"/>
-    <p:sldId id="274" r:id="rId18"/>
-    <p:sldId id="276" r:id="rId19"/>
-    <p:sldId id="277" r:id="rId20"/>
-    <p:sldId id="278" r:id="rId21"/>
-    <p:sldId id="271" r:id="rId22"/>
-    <p:sldId id="272" r:id="rId23"/>
+    <p:sldId id="279" r:id="rId4"/>
+    <p:sldId id="258" r:id="rId5"/>
+    <p:sldId id="259" r:id="rId6"/>
+    <p:sldId id="260" r:id="rId7"/>
+    <p:sldId id="261" r:id="rId8"/>
+    <p:sldId id="262" r:id="rId9"/>
+    <p:sldId id="263" r:id="rId10"/>
+    <p:sldId id="264" r:id="rId11"/>
+    <p:sldId id="265" r:id="rId12"/>
+    <p:sldId id="266" r:id="rId13"/>
+    <p:sldId id="267" r:id="rId14"/>
+    <p:sldId id="269" r:id="rId15"/>
+    <p:sldId id="268" r:id="rId16"/>
+    <p:sldId id="275" r:id="rId17"/>
+    <p:sldId id="273" r:id="rId18"/>
+    <p:sldId id="274" r:id="rId19"/>
+    <p:sldId id="276" r:id="rId20"/>
+    <p:sldId id="277" r:id="rId21"/>
+    <p:sldId id="278" r:id="rId22"/>
+    <p:sldId id="271" r:id="rId23"/>
+    <p:sldId id="272" r:id="rId24"/>
   </p:sldIdLst>
   <p:sldSz cx="12192000" cy="6858000"/>
   <p:notesSz cx="6858000" cy="9144000"/>
@@ -3253,7 +3254,7 @@
           <a:p>
             <a:fld id="{97684994-E592-1946-8C40-1CF597763C26}" type="datetimeFigureOut">
               <a:rPr lang="en-FI" smtClean="0"/>
-              <a:t>09/05/2025</a:t>
+              <a:t>9/5/25</a:t>
             </a:fld>
             <a:endParaRPr lang="en-FI"/>
           </a:p>
@@ -3453,7 +3454,7 @@
           <a:p>
             <a:fld id="{97684994-E592-1946-8C40-1CF597763C26}" type="datetimeFigureOut">
               <a:rPr lang="en-FI" smtClean="0"/>
-              <a:t>09/05/2025</a:t>
+              <a:t>9/5/25</a:t>
             </a:fld>
             <a:endParaRPr lang="en-FI"/>
           </a:p>
@@ -3663,7 +3664,7 @@
           <a:p>
             <a:fld id="{97684994-E592-1946-8C40-1CF597763C26}" type="datetimeFigureOut">
               <a:rPr lang="en-FI" smtClean="0"/>
-              <a:t>09/05/2025</a:t>
+              <a:t>9/5/25</a:t>
             </a:fld>
             <a:endParaRPr lang="en-FI"/>
           </a:p>
@@ -3863,7 +3864,7 @@
           <a:p>
             <a:fld id="{97684994-E592-1946-8C40-1CF597763C26}" type="datetimeFigureOut">
               <a:rPr lang="en-FI" smtClean="0"/>
-              <a:t>09/05/2025</a:t>
+              <a:t>9/5/25</a:t>
             </a:fld>
             <a:endParaRPr lang="en-FI"/>
           </a:p>
@@ -4139,7 +4140,7 @@
           <a:p>
             <a:fld id="{97684994-E592-1946-8C40-1CF597763C26}" type="datetimeFigureOut">
               <a:rPr lang="en-FI" smtClean="0"/>
-              <a:t>09/05/2025</a:t>
+              <a:t>9/5/25</a:t>
             </a:fld>
             <a:endParaRPr lang="en-FI"/>
           </a:p>
@@ -4407,7 +4408,7 @@
           <a:p>
             <a:fld id="{97684994-E592-1946-8C40-1CF597763C26}" type="datetimeFigureOut">
               <a:rPr lang="en-FI" smtClean="0"/>
-              <a:t>09/05/2025</a:t>
+              <a:t>9/5/25</a:t>
             </a:fld>
             <a:endParaRPr lang="en-FI"/>
           </a:p>
@@ -4822,7 +4823,7 @@
           <a:p>
             <a:fld id="{97684994-E592-1946-8C40-1CF597763C26}" type="datetimeFigureOut">
               <a:rPr lang="en-FI" smtClean="0"/>
-              <a:t>09/05/2025</a:t>
+              <a:t>9/5/25</a:t>
             </a:fld>
             <a:endParaRPr lang="en-FI"/>
           </a:p>
@@ -4964,7 +4965,7 @@
           <a:p>
             <a:fld id="{97684994-E592-1946-8C40-1CF597763C26}" type="datetimeFigureOut">
               <a:rPr lang="en-FI" smtClean="0"/>
-              <a:t>09/05/2025</a:t>
+              <a:t>9/5/25</a:t>
             </a:fld>
             <a:endParaRPr lang="en-FI"/>
           </a:p>
@@ -5077,7 +5078,7 @@
           <a:p>
             <a:fld id="{97684994-E592-1946-8C40-1CF597763C26}" type="datetimeFigureOut">
               <a:rPr lang="en-FI" smtClean="0"/>
-              <a:t>09/05/2025</a:t>
+              <a:t>9/5/25</a:t>
             </a:fld>
             <a:endParaRPr lang="en-FI"/>
           </a:p>
@@ -5390,7 +5391,7 @@
           <a:p>
             <a:fld id="{97684994-E592-1946-8C40-1CF597763C26}" type="datetimeFigureOut">
               <a:rPr lang="en-FI" smtClean="0"/>
-              <a:t>09/05/2025</a:t>
+              <a:t>9/5/25</a:t>
             </a:fld>
             <a:endParaRPr lang="en-FI"/>
           </a:p>
@@ -5679,7 +5680,7 @@
           <a:p>
             <a:fld id="{97684994-E592-1946-8C40-1CF597763C26}" type="datetimeFigureOut">
               <a:rPr lang="en-FI" smtClean="0"/>
-              <a:t>09/05/2025</a:t>
+              <a:t>9/5/25</a:t>
             </a:fld>
             <a:endParaRPr lang="en-FI"/>
           </a:p>
@@ -5922,7 +5923,7 @@
           <a:p>
             <a:fld id="{97684994-E592-1946-8C40-1CF597763C26}" type="datetimeFigureOut">
               <a:rPr lang="en-FI" smtClean="0"/>
-              <a:t>09/05/2025</a:t>
+              <a:t>9/5/25</a:t>
             </a:fld>
             <a:endParaRPr lang="en-FI"/>
           </a:p>
@@ -6431,7 +6432,7 @@
           <p:cNvPr id="2" name="Title 1">
             <a:extLst>
               <a:ext uri="{FF2B5EF4-FFF2-40B4-BE49-F238E27FC236}">
-                <a16:creationId xmlns:a16="http://schemas.microsoft.com/office/drawing/2014/main" id="{6B7BC940-5A3C-83F0-9089-CF7CCFE344BC}"/>
+                <a16:creationId xmlns:a16="http://schemas.microsoft.com/office/drawing/2014/main" id="{6854363E-2AE7-A48F-12CB-9F0FBECDE775}"/>
               </a:ext>
             </a:extLst>
           </p:cNvPr>
@@ -6449,7 +6450,7 @@
           <a:p>
             <a:r>
               <a:rPr lang="en-FI" dirty="0"/>
-              <a:t>JSON</a:t>
+              <a:t>Response formats</a:t>
             </a:r>
           </a:p>
         </p:txBody>
@@ -6459,7 +6460,7 @@
           <p:cNvPr id="3" name="Content Placeholder 2">
             <a:extLst>
               <a:ext uri="{FF2B5EF4-FFF2-40B4-BE49-F238E27FC236}">
-                <a16:creationId xmlns:a16="http://schemas.microsoft.com/office/drawing/2014/main" id="{3A60F173-1186-A03B-3E52-375D644F0873}"/>
+                <a16:creationId xmlns:a16="http://schemas.microsoft.com/office/drawing/2014/main" id="{BEAD65EC-F7A5-101B-F898-2C29DD9B344C}"/>
               </a:ext>
             </a:extLst>
           </p:cNvPr>
@@ -6475,27 +6476,33 @@
           <a:bodyPr/>
           <a:lstStyle/>
           <a:p>
-            <a:pPr marL="0" indent="0">
-              <a:buNone/>
-            </a:pPr>
-            <a:r>
-              <a:rPr lang="en-FI" dirty="0">
-                <a:latin typeface="Courier New" panose="02070309020205020404" pitchFamily="49" charset="0"/>
-                <a:cs typeface="Courier New" panose="02070309020205020404" pitchFamily="49" charset="0"/>
-              </a:rPr>
-              <a:t>”key”: ”value”,</a:t>
-            </a:r>
-          </a:p>
-          <a:p>
-            <a:pPr marL="0" indent="0">
-              <a:buNone/>
-            </a:pPr>
-            <a:r>
-              <a:rPr lang="en-FI" dirty="0">
-                <a:latin typeface="Courier New" panose="02070309020205020404" pitchFamily="49" charset="0"/>
-                <a:cs typeface="Courier New" panose="02070309020205020404" pitchFamily="49" charset="0"/>
-              </a:rPr>
-              <a:t>”another_key”: ”another value”</a:t>
+            <a:r>
+              <a:rPr lang="en-FI" dirty="0"/>
+              <a:t>Raw text</a:t>
+            </a:r>
+          </a:p>
+          <a:p>
+            <a:r>
+              <a:rPr lang="en-FI" dirty="0"/>
+              <a:t>HTML/XML</a:t>
+            </a:r>
+          </a:p>
+          <a:p>
+            <a:r>
+              <a:rPr lang="en-FI" dirty="0"/>
+              <a:t>JSON</a:t>
+            </a:r>
+          </a:p>
+          <a:p>
+            <a:r>
+              <a:rPr lang="en-FI" dirty="0"/>
+              <a:t>Image</a:t>
+            </a:r>
+          </a:p>
+          <a:p>
+            <a:r>
+              <a:rPr lang="en-FI" dirty="0"/>
+              <a:t>File</a:t>
             </a:r>
           </a:p>
         </p:txBody>
@@ -6503,7 +6510,7 @@
     </p:spTree>
     <p:extLst>
       <p:ext uri="{BB962C8B-B14F-4D97-AF65-F5344CB8AC3E}">
-        <p14:creationId xmlns:p14="http://schemas.microsoft.com/office/powerpoint/2010/main" val="4191968146"/>
+        <p14:creationId xmlns:p14="http://schemas.microsoft.com/office/powerpoint/2010/main" val="2420404371"/>
       </p:ext>
     </p:extLst>
   </p:cSld>
@@ -6587,7 +6594,7 @@
                 <a:latin typeface="Courier New" panose="02070309020205020404" pitchFamily="49" charset="0"/>
                 <a:cs typeface="Courier New" panose="02070309020205020404" pitchFamily="49" charset="0"/>
               </a:rPr>
-              <a:t>{</a:t>
+              <a:t>”key”: ”value”,</a:t>
             </a:r>
           </a:p>
           <a:p>
@@ -6599,43 +6606,7 @@
                 <a:latin typeface="Courier New" panose="02070309020205020404" pitchFamily="49" charset="0"/>
                 <a:cs typeface="Courier New" panose="02070309020205020404" pitchFamily="49" charset="0"/>
               </a:rPr>
-              <a:t>	”example”: 1.6,</a:t>
-            </a:r>
-          </a:p>
-          <a:p>
-            <a:pPr marL="0" indent="0">
-              <a:buNone/>
-            </a:pPr>
-            <a:r>
-              <a:rPr lang="en-FI" dirty="0">
-                <a:latin typeface="Courier New" panose="02070309020205020404" pitchFamily="49" charset="0"/>
-                <a:cs typeface="Courier New" panose="02070309020205020404" pitchFamily="49" charset="0"/>
-              </a:rPr>
-              <a:t>	”another_example”: false,</a:t>
-            </a:r>
-          </a:p>
-          <a:p>
-            <a:pPr marL="0" indent="0">
-              <a:buNone/>
-            </a:pPr>
-            <a:r>
-              <a:rPr lang="en-FI" dirty="0">
-                <a:latin typeface="Courier New" panose="02070309020205020404" pitchFamily="49" charset="0"/>
-                <a:cs typeface="Courier New" panose="02070309020205020404" pitchFamily="49" charset="0"/>
-              </a:rPr>
-              <a:t>	”third_example”: ”the end”</a:t>
-            </a:r>
-          </a:p>
-          <a:p>
-            <a:pPr marL="0" indent="0">
-              <a:buNone/>
-            </a:pPr>
-            <a:r>
-              <a:rPr lang="en-FI" dirty="0">
-                <a:latin typeface="Courier New" panose="02070309020205020404" pitchFamily="49" charset="0"/>
-                <a:cs typeface="Courier New" panose="02070309020205020404" pitchFamily="49" charset="0"/>
-              </a:rPr>
-              <a:t>}</a:t>
+              <a:t>”another_key”: ”another value”</a:t>
             </a:r>
           </a:p>
         </p:txBody>
@@ -6643,7 +6614,7 @@
     </p:spTree>
     <p:extLst>
       <p:ext uri="{BB962C8B-B14F-4D97-AF65-F5344CB8AC3E}">
-        <p14:creationId xmlns:p14="http://schemas.microsoft.com/office/powerpoint/2010/main" val="35889249"/>
+        <p14:creationId xmlns:p14="http://schemas.microsoft.com/office/powerpoint/2010/main" val="4191968146"/>
       </p:ext>
     </p:extLst>
   </p:cSld>
@@ -6716,24 +6687,10 @@
         </p:nvSpPr>
         <p:spPr/>
         <p:txBody>
-          <a:bodyPr>
-            <a:normAutofit fontScale="92500" lnSpcReduction="10000"/>
-          </a:bodyPr>
+          <a:bodyPr/>
           <a:lstStyle/>
           <a:p>
             <a:pPr marL="0" indent="0">
-              <a:buNone/>
-            </a:pPr>
-            <a:r>
-              <a:rPr lang="en-FI" dirty="0">
-                <a:latin typeface="Courier New" panose="02070309020205020404" pitchFamily="49" charset="0"/>
-                <a:cs typeface="Courier New" panose="02070309020205020404" pitchFamily="49" charset="0"/>
-              </a:rPr>
-              <a:t>[</a:t>
-            </a:r>
-          </a:p>
-          <a:p>
-            <a:pPr marL="457200" lvl="1" indent="0">
               <a:buNone/>
             </a:pPr>
             <a:r>
@@ -6745,7 +6702,7 @@
             </a:r>
           </a:p>
           <a:p>
-            <a:pPr marL="457200" lvl="1" indent="0">
+            <a:pPr marL="0" indent="0">
               <a:buNone/>
             </a:pPr>
             <a:r>
@@ -6757,7 +6714,7 @@
             </a:r>
           </a:p>
           <a:p>
-            <a:pPr marL="457200" lvl="1" indent="0">
+            <a:pPr marL="0" indent="0">
               <a:buNone/>
             </a:pPr>
             <a:r>
@@ -6769,7 +6726,7 @@
             </a:r>
           </a:p>
           <a:p>
-            <a:pPr marL="457200" lvl="1" indent="0">
+            <a:pPr marL="0" indent="0">
               <a:buNone/>
             </a:pPr>
             <a:r>
@@ -6781,67 +6738,7 @@
             </a:r>
           </a:p>
           <a:p>
-            <a:pPr marL="457200" lvl="1" indent="0">
-              <a:buNone/>
-            </a:pPr>
-            <a:r>
-              <a:rPr lang="en-FI" dirty="0">
-                <a:latin typeface="Courier New" panose="02070309020205020404" pitchFamily="49" charset="0"/>
-                <a:cs typeface="Courier New" panose="02070309020205020404" pitchFamily="49" charset="0"/>
-              </a:rPr>
-              <a:t>} ,</a:t>
-            </a:r>
-          </a:p>
-          <a:p>
-            <a:pPr marL="457200" lvl="1" indent="0">
-              <a:buNone/>
-            </a:pPr>
-            <a:r>
-              <a:rPr lang="en-FI" dirty="0">
-                <a:latin typeface="Courier New" panose="02070309020205020404" pitchFamily="49" charset="0"/>
-                <a:cs typeface="Courier New" panose="02070309020205020404" pitchFamily="49" charset="0"/>
-              </a:rPr>
-              <a:t>{</a:t>
-            </a:r>
-          </a:p>
-          <a:p>
-            <a:pPr marL="457200" lvl="1" indent="0">
-              <a:buNone/>
-            </a:pPr>
-            <a:r>
-              <a:rPr lang="en-FI" dirty="0">
-                <a:latin typeface="Courier New" panose="02070309020205020404" pitchFamily="49" charset="0"/>
-                <a:cs typeface="Courier New" panose="02070309020205020404" pitchFamily="49" charset="0"/>
-              </a:rPr>
-              <a:t>	”example”: 1.6,</a:t>
-            </a:r>
-          </a:p>
-          <a:p>
-            <a:pPr marL="457200" lvl="1" indent="0">
-              <a:buNone/>
-            </a:pPr>
-            <a:r>
-              <a:rPr lang="en-FI" dirty="0">
-                <a:latin typeface="Courier New" panose="02070309020205020404" pitchFamily="49" charset="0"/>
-                <a:cs typeface="Courier New" panose="02070309020205020404" pitchFamily="49" charset="0"/>
-              </a:rPr>
-              <a:t>	”another_example”: false,</a:t>
-            </a:r>
-          </a:p>
-          <a:p>
-            <a:pPr marL="457200" lvl="1" indent="0">
-              <a:buNone/>
-            </a:pPr>
-            <a:r>
-              <a:rPr lang="en-FI" dirty="0">
-                <a:latin typeface="Courier New" panose="02070309020205020404" pitchFamily="49" charset="0"/>
-                <a:cs typeface="Courier New" panose="02070309020205020404" pitchFamily="49" charset="0"/>
-              </a:rPr>
-              <a:t>	”third_example”: ”the end”</a:t>
-            </a:r>
-          </a:p>
-          <a:p>
-            <a:pPr marL="457200" lvl="1" indent="0">
+            <a:pPr marL="0" indent="0">
               <a:buNone/>
             </a:pPr>
             <a:r>
@@ -6852,24 +6749,12 @@
               <a:t>}</a:t>
             </a:r>
           </a:p>
-          <a:p>
-            <a:pPr marL="0" indent="0">
-              <a:buNone/>
-            </a:pPr>
-            <a:r>
-              <a:rPr lang="en-FI" dirty="0">
-                <a:latin typeface="Courier New" panose="02070309020205020404" pitchFamily="49" charset="0"/>
-                <a:cs typeface="Courier New" panose="02070309020205020404" pitchFamily="49" charset="0"/>
-              </a:rPr>
-              <a:t>]</a:t>
-            </a:r>
-          </a:p>
         </p:txBody>
       </p:sp>
     </p:spTree>
     <p:extLst>
       <p:ext uri="{BB962C8B-B14F-4D97-AF65-F5344CB8AC3E}">
-        <p14:creationId xmlns:p14="http://schemas.microsoft.com/office/powerpoint/2010/main" val="1676612959"/>
+        <p14:creationId xmlns:p14="http://schemas.microsoft.com/office/powerpoint/2010/main" val="35889249"/>
       </p:ext>
     </p:extLst>
   </p:cSld>
@@ -6901,7 +6786,7 @@
           <p:cNvPr id="2" name="Title 1">
             <a:extLst>
               <a:ext uri="{FF2B5EF4-FFF2-40B4-BE49-F238E27FC236}">
-                <a16:creationId xmlns:a16="http://schemas.microsoft.com/office/drawing/2014/main" id="{473D49C5-E7B2-ED5B-0E60-8AFFB702CE83}"/>
+                <a16:creationId xmlns:a16="http://schemas.microsoft.com/office/drawing/2014/main" id="{6B7BC940-5A3C-83F0-9089-CF7CCFE344BC}"/>
               </a:ext>
             </a:extLst>
           </p:cNvPr>
@@ -6919,7 +6804,7 @@
           <a:p>
             <a:r>
               <a:rPr lang="en-FI" dirty="0"/>
-              <a:t>Example</a:t>
+              <a:t>JSON</a:t>
             </a:r>
           </a:p>
         </p:txBody>
@@ -6929,7 +6814,7 @@
           <p:cNvPr id="3" name="Content Placeholder 2">
             <a:extLst>
               <a:ext uri="{FF2B5EF4-FFF2-40B4-BE49-F238E27FC236}">
-                <a16:creationId xmlns:a16="http://schemas.microsoft.com/office/drawing/2014/main" id="{DA2F61C7-8401-A6F5-7186-E3E596B40A43}"/>
+                <a16:creationId xmlns:a16="http://schemas.microsoft.com/office/drawing/2014/main" id="{3A60F173-1186-A03B-3E52-375D644F0873}"/>
               </a:ext>
             </a:extLst>
           </p:cNvPr>
@@ -6942,17 +6827,160 @@
         </p:nvSpPr>
         <p:spPr/>
         <p:txBody>
-          <a:bodyPr/>
+          <a:bodyPr>
+            <a:normAutofit fontScale="92500" lnSpcReduction="10000"/>
+          </a:bodyPr>
           <a:lstStyle/>
           <a:p>
-            <a:endParaRPr lang="en-FI"/>
+            <a:pPr marL="0" indent="0">
+              <a:buNone/>
+            </a:pPr>
+            <a:r>
+              <a:rPr lang="en-FI" dirty="0">
+                <a:latin typeface="Courier New" panose="02070309020205020404" pitchFamily="49" charset="0"/>
+                <a:cs typeface="Courier New" panose="02070309020205020404" pitchFamily="49" charset="0"/>
+              </a:rPr>
+              <a:t>[</a:t>
+            </a:r>
+          </a:p>
+          <a:p>
+            <a:pPr marL="457200" lvl="1" indent="0">
+              <a:buNone/>
+            </a:pPr>
+            <a:r>
+              <a:rPr lang="en-FI" dirty="0">
+                <a:latin typeface="Courier New" panose="02070309020205020404" pitchFamily="49" charset="0"/>
+                <a:cs typeface="Courier New" panose="02070309020205020404" pitchFamily="49" charset="0"/>
+              </a:rPr>
+              <a:t>{</a:t>
+            </a:r>
+          </a:p>
+          <a:p>
+            <a:pPr marL="457200" lvl="1" indent="0">
+              <a:buNone/>
+            </a:pPr>
+            <a:r>
+              <a:rPr lang="en-FI" dirty="0">
+                <a:latin typeface="Courier New" panose="02070309020205020404" pitchFamily="49" charset="0"/>
+                <a:cs typeface="Courier New" panose="02070309020205020404" pitchFamily="49" charset="0"/>
+              </a:rPr>
+              <a:t>	”example”: 1.6,</a:t>
+            </a:r>
+          </a:p>
+          <a:p>
+            <a:pPr marL="457200" lvl="1" indent="0">
+              <a:buNone/>
+            </a:pPr>
+            <a:r>
+              <a:rPr lang="en-FI" dirty="0">
+                <a:latin typeface="Courier New" panose="02070309020205020404" pitchFamily="49" charset="0"/>
+                <a:cs typeface="Courier New" panose="02070309020205020404" pitchFamily="49" charset="0"/>
+              </a:rPr>
+              <a:t>	”another_example”: false,</a:t>
+            </a:r>
+          </a:p>
+          <a:p>
+            <a:pPr marL="457200" lvl="1" indent="0">
+              <a:buNone/>
+            </a:pPr>
+            <a:r>
+              <a:rPr lang="en-FI" dirty="0">
+                <a:latin typeface="Courier New" panose="02070309020205020404" pitchFamily="49" charset="0"/>
+                <a:cs typeface="Courier New" panose="02070309020205020404" pitchFamily="49" charset="0"/>
+              </a:rPr>
+              <a:t>	”third_example”: ”the end”</a:t>
+            </a:r>
+          </a:p>
+          <a:p>
+            <a:pPr marL="457200" lvl="1" indent="0">
+              <a:buNone/>
+            </a:pPr>
+            <a:r>
+              <a:rPr lang="en-FI" dirty="0">
+                <a:latin typeface="Courier New" panose="02070309020205020404" pitchFamily="49" charset="0"/>
+                <a:cs typeface="Courier New" panose="02070309020205020404" pitchFamily="49" charset="0"/>
+              </a:rPr>
+              <a:t>} ,</a:t>
+            </a:r>
+          </a:p>
+          <a:p>
+            <a:pPr marL="457200" lvl="1" indent="0">
+              <a:buNone/>
+            </a:pPr>
+            <a:r>
+              <a:rPr lang="en-FI" dirty="0">
+                <a:latin typeface="Courier New" panose="02070309020205020404" pitchFamily="49" charset="0"/>
+                <a:cs typeface="Courier New" panose="02070309020205020404" pitchFamily="49" charset="0"/>
+              </a:rPr>
+              <a:t>{</a:t>
+            </a:r>
+          </a:p>
+          <a:p>
+            <a:pPr marL="457200" lvl="1" indent="0">
+              <a:buNone/>
+            </a:pPr>
+            <a:r>
+              <a:rPr lang="en-FI" dirty="0">
+                <a:latin typeface="Courier New" panose="02070309020205020404" pitchFamily="49" charset="0"/>
+                <a:cs typeface="Courier New" panose="02070309020205020404" pitchFamily="49" charset="0"/>
+              </a:rPr>
+              <a:t>	”example”: 1.6,</a:t>
+            </a:r>
+          </a:p>
+          <a:p>
+            <a:pPr marL="457200" lvl="1" indent="0">
+              <a:buNone/>
+            </a:pPr>
+            <a:r>
+              <a:rPr lang="en-FI" dirty="0">
+                <a:latin typeface="Courier New" panose="02070309020205020404" pitchFamily="49" charset="0"/>
+                <a:cs typeface="Courier New" panose="02070309020205020404" pitchFamily="49" charset="0"/>
+              </a:rPr>
+              <a:t>	”another_example”: false,</a:t>
+            </a:r>
+          </a:p>
+          <a:p>
+            <a:pPr marL="457200" lvl="1" indent="0">
+              <a:buNone/>
+            </a:pPr>
+            <a:r>
+              <a:rPr lang="en-FI" dirty="0">
+                <a:latin typeface="Courier New" panose="02070309020205020404" pitchFamily="49" charset="0"/>
+                <a:cs typeface="Courier New" panose="02070309020205020404" pitchFamily="49" charset="0"/>
+              </a:rPr>
+              <a:t>	”third_example”: ”the end”</a:t>
+            </a:r>
+          </a:p>
+          <a:p>
+            <a:pPr marL="457200" lvl="1" indent="0">
+              <a:buNone/>
+            </a:pPr>
+            <a:r>
+              <a:rPr lang="en-FI" dirty="0">
+                <a:latin typeface="Courier New" panose="02070309020205020404" pitchFamily="49" charset="0"/>
+                <a:cs typeface="Courier New" panose="02070309020205020404" pitchFamily="49" charset="0"/>
+              </a:rPr>
+              <a:t>}</a:t>
+            </a:r>
+          </a:p>
+          <a:p>
+            <a:pPr marL="0" indent="0">
+              <a:buNone/>
+            </a:pPr>
+            <a:r>
+              <a:rPr lang="en-FI" dirty="0">
+                <a:latin typeface="Courier New" panose="02070309020205020404" pitchFamily="49" charset="0"/>
+                <a:cs typeface="Courier New" panose="02070309020205020404" pitchFamily="49" charset="0"/>
+              </a:rPr>
+              <a:t>]</a:t>
+            </a:r>
           </a:p>
         </p:txBody>
       </p:sp>
     </p:spTree>
     <p:extLst>
       <p:ext uri="{BB962C8B-B14F-4D97-AF65-F5344CB8AC3E}">
-        <p14:creationId xmlns:p14="http://schemas.microsoft.com/office/powerpoint/2010/main" val="2749002584"/>
+        <p14:creationId xmlns:p14="http://schemas.microsoft.com/office/powerpoint/2010/main" val="1676612959"/>
       </p:ext>
     </p:extLst>
   </p:cSld>
@@ -6984,6 +7012,89 @@
           <p:cNvPr id="2" name="Title 1">
             <a:extLst>
               <a:ext uri="{FF2B5EF4-FFF2-40B4-BE49-F238E27FC236}">
+                <a16:creationId xmlns:a16="http://schemas.microsoft.com/office/drawing/2014/main" id="{473D49C5-E7B2-ED5B-0E60-8AFFB702CE83}"/>
+              </a:ext>
+            </a:extLst>
+          </p:cNvPr>
+          <p:cNvSpPr>
+            <a:spLocks noGrp="1"/>
+          </p:cNvSpPr>
+          <p:nvPr>
+            <p:ph type="title"/>
+          </p:nvPr>
+        </p:nvSpPr>
+        <p:spPr/>
+        <p:txBody>
+          <a:bodyPr/>
+          <a:lstStyle/>
+          <a:p>
+            <a:r>
+              <a:rPr lang="en-FI" dirty="0"/>
+              <a:t>Example</a:t>
+            </a:r>
+          </a:p>
+        </p:txBody>
+      </p:sp>
+      <p:sp>
+        <p:nvSpPr>
+          <p:cNvPr id="3" name="Content Placeholder 2">
+            <a:extLst>
+              <a:ext uri="{FF2B5EF4-FFF2-40B4-BE49-F238E27FC236}">
+                <a16:creationId xmlns:a16="http://schemas.microsoft.com/office/drawing/2014/main" id="{DA2F61C7-8401-A6F5-7186-E3E596B40A43}"/>
+              </a:ext>
+            </a:extLst>
+          </p:cNvPr>
+          <p:cNvSpPr>
+            <a:spLocks noGrp="1"/>
+          </p:cNvSpPr>
+          <p:nvPr>
+            <p:ph idx="1"/>
+          </p:nvPr>
+        </p:nvSpPr>
+        <p:spPr/>
+        <p:txBody>
+          <a:bodyPr/>
+          <a:lstStyle/>
+          <a:p>
+            <a:endParaRPr lang="en-FI"/>
+          </a:p>
+        </p:txBody>
+      </p:sp>
+    </p:spTree>
+    <p:extLst>
+      <p:ext uri="{BB962C8B-B14F-4D97-AF65-F5344CB8AC3E}">
+        <p14:creationId xmlns:p14="http://schemas.microsoft.com/office/powerpoint/2010/main" val="2749002584"/>
+      </p:ext>
+    </p:extLst>
+  </p:cSld>
+  <p:clrMapOvr>
+    <a:masterClrMapping/>
+  </p:clrMapOvr>
+</p:sld>
+</file>
+
+<file path=ppt/slides/slide15.xml><?xml version="1.0" encoding="utf-8"?>
+<p:sld xmlns:a="http://schemas.openxmlformats.org/drawingml/2006/main" xmlns:r="http://schemas.openxmlformats.org/officeDocument/2006/relationships" xmlns:p="http://schemas.openxmlformats.org/presentationml/2006/main">
+  <p:cSld>
+    <p:spTree>
+      <p:nvGrpSpPr>
+        <p:cNvPr id="1" name=""/>
+        <p:cNvGrpSpPr/>
+        <p:nvPr/>
+      </p:nvGrpSpPr>
+      <p:grpSpPr>
+        <a:xfrm>
+          <a:off x="0" y="0"/>
+          <a:ext cx="0" cy="0"/>
+          <a:chOff x="0" y="0"/>
+          <a:chExt cx="0" cy="0"/>
+        </a:xfrm>
+      </p:grpSpPr>
+      <p:sp>
+        <p:nvSpPr>
+          <p:cNvPr id="2" name="Title 1">
+            <a:extLst>
+              <a:ext uri="{FF2B5EF4-FFF2-40B4-BE49-F238E27FC236}">
                 <a16:creationId xmlns:a16="http://schemas.microsoft.com/office/drawing/2014/main" id="{D7C314DA-17B7-4FAF-B650-86BCDA9F20BA}"/>
               </a:ext>
             </a:extLst>
@@ -7171,7 +7282,7 @@
 </p:sld>
 </file>
 
-<file path=ppt/slides/slide15.xml><?xml version="1.0" encoding="utf-8"?>
+<file path=ppt/slides/slide16.xml><?xml version="1.0" encoding="utf-8"?>
 <p:sld xmlns:a="http://schemas.openxmlformats.org/drawingml/2006/main" xmlns:r="http://schemas.openxmlformats.org/officeDocument/2006/relationships" xmlns:p="http://schemas.openxmlformats.org/presentationml/2006/main">
   <p:cSld>
     <p:bg>
@@ -7393,7 +7504,7 @@
 </p:sld>
 </file>
 
-<file path=ppt/slides/slide16.xml><?xml version="1.0" encoding="utf-8"?>
+<file path=ppt/slides/slide17.xml><?xml version="1.0" encoding="utf-8"?>
 <p:sld xmlns:a="http://schemas.openxmlformats.org/drawingml/2006/main" xmlns:r="http://schemas.openxmlformats.org/officeDocument/2006/relationships" xmlns:p="http://schemas.openxmlformats.org/presentationml/2006/main">
   <p:cSld>
     <p:spTree>
@@ -7761,7 +7872,7 @@
 </p:sld>
 </file>
 
-<file path=ppt/slides/slide17.xml><?xml version="1.0" encoding="utf-8"?>
+<file path=ppt/slides/slide18.xml><?xml version="1.0" encoding="utf-8"?>
 <p:sld xmlns:a="http://schemas.openxmlformats.org/drawingml/2006/main" xmlns:r="http://schemas.openxmlformats.org/officeDocument/2006/relationships" xmlns:p="http://schemas.openxmlformats.org/presentationml/2006/main">
   <p:cSld>
     <p:spTree>
@@ -8023,7 +8134,7 @@
 </p:sld>
 </file>
 
-<file path=ppt/slides/slide18.xml><?xml version="1.0" encoding="utf-8"?>
+<file path=ppt/slides/slide19.xml><?xml version="1.0" encoding="utf-8"?>
 <p:sld xmlns:a="http://schemas.openxmlformats.org/drawingml/2006/main" xmlns:r="http://schemas.openxmlformats.org/officeDocument/2006/relationships" xmlns:p="http://schemas.openxmlformats.org/presentationml/2006/main">
   <p:cSld>
     <p:spTree>
@@ -8230,252 +8341,6 @@
     <p:extLst>
       <p:ext uri="{BB962C8B-B14F-4D97-AF65-F5344CB8AC3E}">
         <p14:creationId xmlns:p14="http://schemas.microsoft.com/office/powerpoint/2010/main" val="3973917026"/>
-      </p:ext>
-    </p:extLst>
-  </p:cSld>
-  <p:clrMapOvr>
-    <a:masterClrMapping/>
-  </p:clrMapOvr>
-</p:sld>
-</file>
-
-<file path=ppt/slides/slide19.xml><?xml version="1.0" encoding="utf-8"?>
-<p:sld xmlns:a="http://schemas.openxmlformats.org/drawingml/2006/main" xmlns:r="http://schemas.openxmlformats.org/officeDocument/2006/relationships" xmlns:p="http://schemas.openxmlformats.org/presentationml/2006/main">
-  <p:cSld>
-    <p:spTree>
-      <p:nvGrpSpPr>
-        <p:cNvPr id="1" name=""/>
-        <p:cNvGrpSpPr/>
-        <p:nvPr/>
-      </p:nvGrpSpPr>
-      <p:grpSpPr>
-        <a:xfrm>
-          <a:off x="0" y="0"/>
-          <a:ext cx="0" cy="0"/>
-          <a:chOff x="0" y="0"/>
-          <a:chExt cx="0" cy="0"/>
-        </a:xfrm>
-      </p:grpSpPr>
-      <p:sp>
-        <p:nvSpPr>
-          <p:cNvPr id="2" name="Title 1">
-            <a:extLst>
-              <a:ext uri="{FF2B5EF4-FFF2-40B4-BE49-F238E27FC236}">
-                <a16:creationId xmlns:a16="http://schemas.microsoft.com/office/drawing/2014/main" id="{0FB03C6D-7445-EB35-894F-704266B56AF1}"/>
-              </a:ext>
-            </a:extLst>
-          </p:cNvPr>
-          <p:cNvSpPr>
-            <a:spLocks noGrp="1"/>
-          </p:cNvSpPr>
-          <p:nvPr>
-            <p:ph type="title"/>
-          </p:nvPr>
-        </p:nvSpPr>
-        <p:spPr/>
-        <p:txBody>
-          <a:bodyPr/>
-          <a:lstStyle/>
-          <a:p>
-            <a:r>
-              <a:rPr lang="en-FI" dirty="0"/>
-              <a:t>HTML</a:t>
-            </a:r>
-          </a:p>
-        </p:txBody>
-      </p:sp>
-      <p:sp>
-        <p:nvSpPr>
-          <p:cNvPr id="3" name="Content Placeholder 2">
-            <a:extLst>
-              <a:ext uri="{FF2B5EF4-FFF2-40B4-BE49-F238E27FC236}">
-                <a16:creationId xmlns:a16="http://schemas.microsoft.com/office/drawing/2014/main" id="{45A3AA27-6EBD-E220-5A47-3CF80718F7DF}"/>
-              </a:ext>
-            </a:extLst>
-          </p:cNvPr>
-          <p:cNvSpPr>
-            <a:spLocks noGrp="1"/>
-          </p:cNvSpPr>
-          <p:nvPr>
-            <p:ph idx="1"/>
-          </p:nvPr>
-        </p:nvSpPr>
-        <p:spPr/>
-        <p:txBody>
-          <a:bodyPr/>
-          <a:lstStyle/>
-          <a:p>
-            <a:pPr marL="0" indent="0">
-              <a:buNone/>
-            </a:pPr>
-            <a:r>
-              <a:rPr lang="en-GB" dirty="0"/>
-              <a:t>&lt;div&gt;</a:t>
-            </a:r>
-          </a:p>
-          <a:p>
-            <a:pPr marL="0" indent="0">
-              <a:buNone/>
-            </a:pPr>
-            <a:r>
-              <a:rPr lang="en-GB" dirty="0"/>
-              <a:t>	 &lt;h1&gt;Example Domain&lt;/h1&gt;</a:t>
-            </a:r>
-          </a:p>
-          <a:p>
-            <a:pPr marL="0" indent="0">
-              <a:buNone/>
-            </a:pPr>
-            <a:r>
-              <a:rPr lang="en-GB" dirty="0"/>
-              <a:t>	 &lt;p&gt;This domain is for use in illustrative examples in documents. You may use this domain in literature without prior coordination or asking for permission.&lt;/p&gt; 	&lt;p&gt;&lt;a </a:t>
-            </a:r>
-            <a:r>
-              <a:rPr lang="en-GB" dirty="0" err="1"/>
-              <a:t>href</a:t>
-            </a:r>
-            <a:r>
-              <a:rPr lang="en-GB" dirty="0"/>
-              <a:t>="</a:t>
-            </a:r>
-            <a:r>
-              <a:rPr lang="en-GB" dirty="0">
-                <a:hlinkClick r:id="rId2"/>
-              </a:rPr>
-              <a:t>https://www.iana.org/domains/example</a:t>
-            </a:r>
-            <a:r>
-              <a:rPr lang="en-GB" dirty="0"/>
-              <a:t>"&gt;More information...&lt;/a&gt;&lt;/p&gt; </a:t>
-            </a:r>
-          </a:p>
-          <a:p>
-            <a:pPr marL="0" indent="0">
-              <a:buNone/>
-            </a:pPr>
-            <a:r>
-              <a:rPr lang="en-GB" dirty="0"/>
-              <a:t>&lt;/div&gt; </a:t>
-            </a:r>
-          </a:p>
-          <a:p>
-            <a:pPr marL="0" indent="0">
-              <a:buNone/>
-            </a:pPr>
-            <a:endParaRPr lang="en-FI" dirty="0"/>
-          </a:p>
-        </p:txBody>
-      </p:sp>
-      <p:sp>
-        <p:nvSpPr>
-          <p:cNvPr id="4" name="Rounded Rectangular Callout 3">
-            <a:extLst>
-              <a:ext uri="{FF2B5EF4-FFF2-40B4-BE49-F238E27FC236}">
-                <a16:creationId xmlns:a16="http://schemas.microsoft.com/office/drawing/2014/main" id="{4279AE04-93B2-B9B8-0377-C489F808185A}"/>
-              </a:ext>
-            </a:extLst>
-          </p:cNvPr>
-          <p:cNvSpPr/>
-          <p:nvPr/>
-        </p:nvSpPr>
-        <p:spPr>
-          <a:xfrm>
-            <a:off x="6324632" y="5605737"/>
-            <a:ext cx="2785241" cy="1142452"/>
-          </a:xfrm>
-          <a:prstGeom prst="wedgeRoundRectCallout">
-            <a:avLst>
-              <a:gd name="adj1" fmla="val -195785"/>
-              <a:gd name="adj2" fmla="val -92132"/>
-              <a:gd name="adj3" fmla="val 16667"/>
-            </a:avLst>
-          </a:prstGeom>
-        </p:spPr>
-        <p:style>
-          <a:lnRef idx="2">
-            <a:schemeClr val="accent1">
-              <a:shade val="15000"/>
-            </a:schemeClr>
-          </a:lnRef>
-          <a:fillRef idx="1">
-            <a:schemeClr val="accent1"/>
-          </a:fillRef>
-          <a:effectRef idx="0">
-            <a:schemeClr val="accent1"/>
-          </a:effectRef>
-          <a:fontRef idx="minor">
-            <a:schemeClr val="lt1"/>
-          </a:fontRef>
-        </p:style>
-        <p:txBody>
-          <a:bodyPr rtlCol="0" anchor="ctr"/>
-          <a:lstStyle/>
-          <a:p>
-            <a:pPr algn="ctr"/>
-            <a:r>
-              <a:rPr lang="en-FI" dirty="0"/>
-              <a:t>Parent</a:t>
-            </a:r>
-          </a:p>
-        </p:txBody>
-      </p:sp>
-      <p:sp>
-        <p:nvSpPr>
-          <p:cNvPr id="5" name="Rounded Rectangular Callout 4">
-            <a:extLst>
-              <a:ext uri="{FF2B5EF4-FFF2-40B4-BE49-F238E27FC236}">
-                <a16:creationId xmlns:a16="http://schemas.microsoft.com/office/drawing/2014/main" id="{25BE2733-A79C-8193-5153-16452BA4133B}"/>
-              </a:ext>
-            </a:extLst>
-          </p:cNvPr>
-          <p:cNvSpPr/>
-          <p:nvPr/>
-        </p:nvSpPr>
-        <p:spPr>
-          <a:xfrm>
-            <a:off x="7144439" y="918665"/>
-            <a:ext cx="2785241" cy="1142452"/>
-          </a:xfrm>
-          <a:prstGeom prst="wedgeRoundRectCallout">
-            <a:avLst>
-              <a:gd name="adj1" fmla="val -170879"/>
-              <a:gd name="adj2" fmla="val 170983"/>
-              <a:gd name="adj3" fmla="val 16667"/>
-            </a:avLst>
-          </a:prstGeom>
-        </p:spPr>
-        <p:style>
-          <a:lnRef idx="2">
-            <a:schemeClr val="accent1">
-              <a:shade val="15000"/>
-            </a:schemeClr>
-          </a:lnRef>
-          <a:fillRef idx="1">
-            <a:schemeClr val="accent1"/>
-          </a:fillRef>
-          <a:effectRef idx="0">
-            <a:schemeClr val="accent1"/>
-          </a:effectRef>
-          <a:fontRef idx="minor">
-            <a:schemeClr val="lt1"/>
-          </a:fontRef>
-        </p:style>
-        <p:txBody>
-          <a:bodyPr rtlCol="0" anchor="ctr"/>
-          <a:lstStyle/>
-          <a:p>
-            <a:pPr algn="ctr"/>
-            <a:r>
-              <a:rPr lang="en-FI" dirty="0"/>
-              <a:t>Children</a:t>
-            </a:r>
-          </a:p>
-        </p:txBody>
-      </p:sp>
-    </p:spTree>
-    <p:extLst>
-      <p:ext uri="{BB962C8B-B14F-4D97-AF65-F5344CB8AC3E}">
-        <p14:creationId xmlns:p14="http://schemas.microsoft.com/office/powerpoint/2010/main" val="783081260"/>
       </p:ext>
     </p:extLst>
   </p:cSld>
@@ -8672,7 +8537,7 @@
           <p:cNvPr id="2" name="Title 1">
             <a:extLst>
               <a:ext uri="{FF2B5EF4-FFF2-40B4-BE49-F238E27FC236}">
-                <a16:creationId xmlns:a16="http://schemas.microsoft.com/office/drawing/2014/main" id="{04A96724-A4D5-9863-6AC6-519D3A74258D}"/>
+                <a16:creationId xmlns:a16="http://schemas.microsoft.com/office/drawing/2014/main" id="{0FB03C6D-7445-EB35-894F-704266B56AF1}"/>
               </a:ext>
             </a:extLst>
           </p:cNvPr>
@@ -8700,7 +8565,7 @@
           <p:cNvPr id="3" name="Content Placeholder 2">
             <a:extLst>
               <a:ext uri="{FF2B5EF4-FFF2-40B4-BE49-F238E27FC236}">
-                <a16:creationId xmlns:a16="http://schemas.microsoft.com/office/drawing/2014/main" id="{378689E6-3AAA-D490-D65B-4E1D6D8C7EDE}"/>
+                <a16:creationId xmlns:a16="http://schemas.microsoft.com/office/drawing/2014/main" id="{45A3AA27-6EBD-E220-5A47-3CF80718F7DF}"/>
               </a:ext>
             </a:extLst>
           </p:cNvPr>
@@ -8713,9 +8578,7 @@
         </p:nvSpPr>
         <p:spPr/>
         <p:txBody>
-          <a:bodyPr>
-            <a:normAutofit fontScale="85000" lnSpcReduction="20000"/>
-          </a:bodyPr>
+          <a:bodyPr/>
           <a:lstStyle/>
           <a:p>
             <a:pPr marL="0" indent="0">
@@ -8723,13 +8586,16 @@
             </a:pPr>
             <a:r>
               <a:rPr lang="en-GB" dirty="0"/>
-              <a:t>Link</a:t>
-            </a:r>
-          </a:p>
-          <a:p>
+              <a:t>&lt;div&gt;</a:t>
+            </a:r>
+          </a:p>
+          <a:p>
+            <a:pPr marL="0" indent="0">
+              <a:buNone/>
+            </a:pPr>
             <a:r>
               <a:rPr lang="en-GB" dirty="0"/>
-              <a:t>A</a:t>
+              <a:t>	 &lt;h1&gt;Example Domain&lt;/h1&gt;</a:t>
             </a:r>
           </a:p>
           <a:p>
@@ -8738,78 +8604,146 @@
             </a:pPr>
             <a:r>
               <a:rPr lang="en-GB" dirty="0"/>
-              <a:t>Structure</a:t>
-            </a:r>
-          </a:p>
-          <a:p>
+              <a:t>	 &lt;p&gt;This domain is for use in illustrative examples in documents. You may use this domain in literature without prior coordination or asking for permission.&lt;/p&gt; 	&lt;p&gt;&lt;a </a:t>
+            </a:r>
+            <a:r>
+              <a:rPr lang="en-GB" dirty="0" err="1"/>
+              <a:t>href</a:t>
+            </a:r>
             <a:r>
               <a:rPr lang="en-GB" dirty="0"/>
-              <a:t>div</a:t>
-            </a:r>
-          </a:p>
-          <a:p>
+              <a:t>="</a:t>
+            </a:r>
+            <a:r>
+              <a:rPr lang="en-GB" dirty="0">
+                <a:hlinkClick r:id="rId2"/>
+              </a:rPr>
+              <a:t>https://www.iana.org/domains/example</a:t>
+            </a:r>
             <a:r>
               <a:rPr lang="en-GB" dirty="0"/>
-              <a:t>span</a:t>
-            </a:r>
-          </a:p>
-          <a:p>
+              <a:t>"&gt;More information...&lt;/a&gt;&lt;/p&gt; </a:t>
+            </a:r>
+          </a:p>
+          <a:p>
+            <a:pPr marL="0" indent="0">
+              <a:buNone/>
+            </a:pPr>
             <a:r>
               <a:rPr lang="en-GB" dirty="0"/>
-              <a:t>Strong</a:t>
-            </a:r>
-          </a:p>
-          <a:p>
-            <a:r>
-              <a:rPr lang="en-GB" dirty="0" err="1"/>
-              <a:t>ol</a:t>
-            </a:r>
-            <a:r>
-              <a:rPr lang="en-GB" dirty="0"/>
-              <a:t>, </a:t>
-            </a:r>
-            <a:r>
-              <a:rPr lang="en-GB" dirty="0" err="1"/>
-              <a:t>ul</a:t>
-            </a:r>
-            <a:r>
-              <a:rPr lang="en-GB" dirty="0"/>
-              <a:t>, li</a:t>
+              <a:t>&lt;/div&gt; </a:t>
             </a:r>
           </a:p>
           <a:p>
             <a:pPr marL="0" indent="0">
               <a:buNone/>
             </a:pPr>
-            <a:r>
-              <a:rPr lang="en-GB" dirty="0"/>
-              <a:t>Media</a:t>
-            </a:r>
-          </a:p>
-          <a:p>
-            <a:r>
-              <a:rPr lang="en-GB" dirty="0" err="1"/>
-              <a:t>i</a:t>
-            </a:r>
+            <a:endParaRPr lang="en-FI" dirty="0"/>
+          </a:p>
+        </p:txBody>
+      </p:sp>
+      <p:sp>
+        <p:nvSpPr>
+          <p:cNvPr id="4" name="Rounded Rectangular Callout 3">
+            <a:extLst>
+              <a:ext uri="{FF2B5EF4-FFF2-40B4-BE49-F238E27FC236}">
+                <a16:creationId xmlns:a16="http://schemas.microsoft.com/office/drawing/2014/main" id="{4279AE04-93B2-B9B8-0377-C489F808185A}"/>
+              </a:ext>
+            </a:extLst>
+          </p:cNvPr>
+          <p:cNvSpPr/>
+          <p:nvPr/>
+        </p:nvSpPr>
+        <p:spPr>
+          <a:xfrm>
+            <a:off x="6324632" y="5605737"/>
+            <a:ext cx="2785241" cy="1142452"/>
+          </a:xfrm>
+          <a:prstGeom prst="wedgeRoundRectCallout">
+            <a:avLst>
+              <a:gd name="adj1" fmla="val -195785"/>
+              <a:gd name="adj2" fmla="val -92132"/>
+              <a:gd name="adj3" fmla="val 16667"/>
+            </a:avLst>
+          </a:prstGeom>
+        </p:spPr>
+        <p:style>
+          <a:lnRef idx="2">
+            <a:schemeClr val="accent1">
+              <a:shade val="15000"/>
+            </a:schemeClr>
+          </a:lnRef>
+          <a:fillRef idx="1">
+            <a:schemeClr val="accent1"/>
+          </a:fillRef>
+          <a:effectRef idx="0">
+            <a:schemeClr val="accent1"/>
+          </a:effectRef>
+          <a:fontRef idx="minor">
+            <a:schemeClr val="lt1"/>
+          </a:fontRef>
+        </p:style>
+        <p:txBody>
+          <a:bodyPr rtlCol="0" anchor="ctr"/>
+          <a:lstStyle/>
+          <a:p>
+            <a:pPr algn="ctr"/>
             <a:r>
               <a:rPr lang="en-FI" dirty="0"/>
-              <a:t>mg</a:t>
-            </a:r>
-          </a:p>
-          <a:p>
-            <a:r>
-              <a:rPr lang="en-GB" dirty="0"/>
-              <a:t>v</a:t>
-            </a:r>
+              <a:t>Parent</a:t>
+            </a:r>
+          </a:p>
+        </p:txBody>
+      </p:sp>
+      <p:sp>
+        <p:nvSpPr>
+          <p:cNvPr id="5" name="Rounded Rectangular Callout 4">
+            <a:extLst>
+              <a:ext uri="{FF2B5EF4-FFF2-40B4-BE49-F238E27FC236}">
+                <a16:creationId xmlns:a16="http://schemas.microsoft.com/office/drawing/2014/main" id="{25BE2733-A79C-8193-5153-16452BA4133B}"/>
+              </a:ext>
+            </a:extLst>
+          </p:cNvPr>
+          <p:cNvSpPr/>
+          <p:nvPr/>
+        </p:nvSpPr>
+        <p:spPr>
+          <a:xfrm>
+            <a:off x="7144439" y="918665"/>
+            <a:ext cx="2785241" cy="1142452"/>
+          </a:xfrm>
+          <a:prstGeom prst="wedgeRoundRectCallout">
+            <a:avLst>
+              <a:gd name="adj1" fmla="val -170879"/>
+              <a:gd name="adj2" fmla="val 170983"/>
+              <a:gd name="adj3" fmla="val 16667"/>
+            </a:avLst>
+          </a:prstGeom>
+        </p:spPr>
+        <p:style>
+          <a:lnRef idx="2">
+            <a:schemeClr val="accent1">
+              <a:shade val="15000"/>
+            </a:schemeClr>
+          </a:lnRef>
+          <a:fillRef idx="1">
+            <a:schemeClr val="accent1"/>
+          </a:fillRef>
+          <a:effectRef idx="0">
+            <a:schemeClr val="accent1"/>
+          </a:effectRef>
+          <a:fontRef idx="minor">
+            <a:schemeClr val="lt1"/>
+          </a:fontRef>
+        </p:style>
+        <p:txBody>
+          <a:bodyPr rtlCol="0" anchor="ctr"/>
+          <a:lstStyle/>
+          <a:p>
+            <a:pPr algn="ctr"/>
             <a:r>
               <a:rPr lang="en-FI" dirty="0"/>
-              <a:t>ideo</a:t>
-            </a:r>
-          </a:p>
-          <a:p>
-            <a:r>
-              <a:rPr lang="en-FI" dirty="0"/>
-              <a:t>audio</a:t>
+              <a:t>Children</a:t>
             </a:r>
           </a:p>
         </p:txBody>
@@ -8817,7 +8751,7 @@
     </p:spTree>
     <p:extLst>
       <p:ext uri="{BB962C8B-B14F-4D97-AF65-F5344CB8AC3E}">
-        <p14:creationId xmlns:p14="http://schemas.microsoft.com/office/powerpoint/2010/main" val="280264831"/>
+        <p14:creationId xmlns:p14="http://schemas.microsoft.com/office/powerpoint/2010/main" val="783081260"/>
       </p:ext>
     </p:extLst>
   </p:cSld>
@@ -8849,6 +8783,183 @@
           <p:cNvPr id="2" name="Title 1">
             <a:extLst>
               <a:ext uri="{FF2B5EF4-FFF2-40B4-BE49-F238E27FC236}">
+                <a16:creationId xmlns:a16="http://schemas.microsoft.com/office/drawing/2014/main" id="{04A96724-A4D5-9863-6AC6-519D3A74258D}"/>
+              </a:ext>
+            </a:extLst>
+          </p:cNvPr>
+          <p:cNvSpPr>
+            <a:spLocks noGrp="1"/>
+          </p:cNvSpPr>
+          <p:nvPr>
+            <p:ph type="title"/>
+          </p:nvPr>
+        </p:nvSpPr>
+        <p:spPr/>
+        <p:txBody>
+          <a:bodyPr/>
+          <a:lstStyle/>
+          <a:p>
+            <a:r>
+              <a:rPr lang="en-FI" dirty="0"/>
+              <a:t>HTML</a:t>
+            </a:r>
+          </a:p>
+        </p:txBody>
+      </p:sp>
+      <p:sp>
+        <p:nvSpPr>
+          <p:cNvPr id="3" name="Content Placeholder 2">
+            <a:extLst>
+              <a:ext uri="{FF2B5EF4-FFF2-40B4-BE49-F238E27FC236}">
+                <a16:creationId xmlns:a16="http://schemas.microsoft.com/office/drawing/2014/main" id="{378689E6-3AAA-D490-D65B-4E1D6D8C7EDE}"/>
+              </a:ext>
+            </a:extLst>
+          </p:cNvPr>
+          <p:cNvSpPr>
+            <a:spLocks noGrp="1"/>
+          </p:cNvSpPr>
+          <p:nvPr>
+            <p:ph idx="1"/>
+          </p:nvPr>
+        </p:nvSpPr>
+        <p:spPr/>
+        <p:txBody>
+          <a:bodyPr>
+            <a:normAutofit fontScale="85000" lnSpcReduction="20000"/>
+          </a:bodyPr>
+          <a:lstStyle/>
+          <a:p>
+            <a:pPr marL="0" indent="0">
+              <a:buNone/>
+            </a:pPr>
+            <a:r>
+              <a:rPr lang="en-GB" dirty="0"/>
+              <a:t>Link</a:t>
+            </a:r>
+          </a:p>
+          <a:p>
+            <a:r>
+              <a:rPr lang="en-GB" dirty="0"/>
+              <a:t>A</a:t>
+            </a:r>
+          </a:p>
+          <a:p>
+            <a:pPr marL="0" indent="0">
+              <a:buNone/>
+            </a:pPr>
+            <a:r>
+              <a:rPr lang="en-GB" dirty="0"/>
+              <a:t>Structure</a:t>
+            </a:r>
+          </a:p>
+          <a:p>
+            <a:r>
+              <a:rPr lang="en-GB" dirty="0"/>
+              <a:t>div</a:t>
+            </a:r>
+          </a:p>
+          <a:p>
+            <a:r>
+              <a:rPr lang="en-GB" dirty="0"/>
+              <a:t>span</a:t>
+            </a:r>
+          </a:p>
+          <a:p>
+            <a:r>
+              <a:rPr lang="en-GB" dirty="0"/>
+              <a:t>Strong</a:t>
+            </a:r>
+          </a:p>
+          <a:p>
+            <a:r>
+              <a:rPr lang="en-GB" dirty="0" err="1"/>
+              <a:t>ol</a:t>
+            </a:r>
+            <a:r>
+              <a:rPr lang="en-GB" dirty="0"/>
+              <a:t>, </a:t>
+            </a:r>
+            <a:r>
+              <a:rPr lang="en-GB" dirty="0" err="1"/>
+              <a:t>ul</a:t>
+            </a:r>
+            <a:r>
+              <a:rPr lang="en-GB" dirty="0"/>
+              <a:t>, li</a:t>
+            </a:r>
+          </a:p>
+          <a:p>
+            <a:pPr marL="0" indent="0">
+              <a:buNone/>
+            </a:pPr>
+            <a:r>
+              <a:rPr lang="en-GB" dirty="0"/>
+              <a:t>Media</a:t>
+            </a:r>
+          </a:p>
+          <a:p>
+            <a:r>
+              <a:rPr lang="en-GB" dirty="0" err="1"/>
+              <a:t>i</a:t>
+            </a:r>
+            <a:r>
+              <a:rPr lang="en-FI" dirty="0"/>
+              <a:t>mg</a:t>
+            </a:r>
+          </a:p>
+          <a:p>
+            <a:r>
+              <a:rPr lang="en-GB" dirty="0"/>
+              <a:t>v</a:t>
+            </a:r>
+            <a:r>
+              <a:rPr lang="en-FI" dirty="0"/>
+              <a:t>ideo</a:t>
+            </a:r>
+          </a:p>
+          <a:p>
+            <a:r>
+              <a:rPr lang="en-FI" dirty="0"/>
+              <a:t>audio</a:t>
+            </a:r>
+          </a:p>
+        </p:txBody>
+      </p:sp>
+    </p:spTree>
+    <p:extLst>
+      <p:ext uri="{BB962C8B-B14F-4D97-AF65-F5344CB8AC3E}">
+        <p14:creationId xmlns:p14="http://schemas.microsoft.com/office/powerpoint/2010/main" val="280264831"/>
+      </p:ext>
+    </p:extLst>
+  </p:cSld>
+  <p:clrMapOvr>
+    <a:masterClrMapping/>
+  </p:clrMapOvr>
+</p:sld>
+</file>
+
+<file path=ppt/slides/slide22.xml><?xml version="1.0" encoding="utf-8"?>
+<p:sld xmlns:a="http://schemas.openxmlformats.org/drawingml/2006/main" xmlns:r="http://schemas.openxmlformats.org/officeDocument/2006/relationships" xmlns:p="http://schemas.openxmlformats.org/presentationml/2006/main">
+  <p:cSld>
+    <p:spTree>
+      <p:nvGrpSpPr>
+        <p:cNvPr id="1" name=""/>
+        <p:cNvGrpSpPr/>
+        <p:nvPr/>
+      </p:nvGrpSpPr>
+      <p:grpSpPr>
+        <a:xfrm>
+          <a:off x="0" y="0"/>
+          <a:ext cx="0" cy="0"/>
+          <a:chOff x="0" y="0"/>
+          <a:chExt cx="0" cy="0"/>
+        </a:xfrm>
+      </p:grpSpPr>
+      <p:sp>
+        <p:nvSpPr>
+          <p:cNvPr id="2" name="Title 1">
+            <a:extLst>
+              <a:ext uri="{FF2B5EF4-FFF2-40B4-BE49-F238E27FC236}">
                 <a16:creationId xmlns:a16="http://schemas.microsoft.com/office/drawing/2014/main" id="{8148C077-A175-1FAF-BB4E-EE08EA07EE17}"/>
               </a:ext>
             </a:extLst>
@@ -8919,7 +9030,7 @@
 </p:sld>
 </file>
 
-<file path=ppt/slides/slide22.xml><?xml version="1.0" encoding="utf-8"?>
+<file path=ppt/slides/slide23.xml><?xml version="1.0" encoding="utf-8"?>
 <p:sld xmlns:a="http://schemas.openxmlformats.org/drawingml/2006/main" xmlns:r="http://schemas.openxmlformats.org/officeDocument/2006/relationships" xmlns:p="http://schemas.openxmlformats.org/presentationml/2006/main">
   <p:cSld>
     <p:spTree>
@@ -8999,6 +9110,105 @@
           <p:cNvPr id="2" name="Title 1">
             <a:extLst>
               <a:ext uri="{FF2B5EF4-FFF2-40B4-BE49-F238E27FC236}">
+                <a16:creationId xmlns:a16="http://schemas.microsoft.com/office/drawing/2014/main" id="{D5BEA196-EFA2-64DD-CEC9-0A90EFDD3535}"/>
+              </a:ext>
+            </a:extLst>
+          </p:cNvPr>
+          <p:cNvSpPr>
+            <a:spLocks noGrp="1"/>
+          </p:cNvSpPr>
+          <p:nvPr>
+            <p:ph type="title"/>
+          </p:nvPr>
+        </p:nvSpPr>
+        <p:spPr/>
+        <p:txBody>
+          <a:bodyPr/>
+          <a:lstStyle/>
+          <a:p>
+            <a:r>
+              <a:rPr lang="en-US" dirty="0"/>
+              <a:t>Evaluation</a:t>
+            </a:r>
+          </a:p>
+        </p:txBody>
+      </p:sp>
+      <p:sp>
+        <p:nvSpPr>
+          <p:cNvPr id="3" name="Content Placeholder 2">
+            <a:extLst>
+              <a:ext uri="{FF2B5EF4-FFF2-40B4-BE49-F238E27FC236}">
+                <a16:creationId xmlns:a16="http://schemas.microsoft.com/office/drawing/2014/main" id="{B64C071F-243B-1D3C-80E1-37171CE1A805}"/>
+              </a:ext>
+            </a:extLst>
+          </p:cNvPr>
+          <p:cNvSpPr>
+            <a:spLocks noGrp="1"/>
+          </p:cNvSpPr>
+          <p:nvPr>
+            <p:ph idx="1"/>
+          </p:nvPr>
+        </p:nvSpPr>
+        <p:spPr/>
+        <p:txBody>
+          <a:bodyPr/>
+          <a:lstStyle/>
+          <a:p>
+            <a:r>
+              <a:rPr lang="en-US" dirty="0"/>
+              <a:t>Weekly assignments, equal weight.</a:t>
+            </a:r>
+          </a:p>
+          <a:p>
+            <a:r>
+              <a:rPr lang="en-US" dirty="0"/>
+              <a:t>Attendance bonus during weeks [2-6] of lecture. </a:t>
+            </a:r>
+            <a:br>
+              <a:rPr lang="en-US" dirty="0"/>
+            </a:br>
+            <a:r>
+              <a:rPr lang="en-US" dirty="0"/>
+              <a:t>+1/100 point towards the final grade for each week.</a:t>
+            </a:r>
+          </a:p>
+        </p:txBody>
+      </p:sp>
+    </p:spTree>
+    <p:extLst>
+      <p:ext uri="{BB962C8B-B14F-4D97-AF65-F5344CB8AC3E}">
+        <p14:creationId xmlns:p14="http://schemas.microsoft.com/office/powerpoint/2010/main" val="2437061877"/>
+      </p:ext>
+    </p:extLst>
+  </p:cSld>
+  <p:clrMapOvr>
+    <a:masterClrMapping/>
+  </p:clrMapOvr>
+</p:sld>
+</file>
+
+<file path=ppt/slides/slide4.xml><?xml version="1.0" encoding="utf-8"?>
+<p:sld xmlns:a="http://schemas.openxmlformats.org/drawingml/2006/main" xmlns:r="http://schemas.openxmlformats.org/officeDocument/2006/relationships" xmlns:p="http://schemas.openxmlformats.org/presentationml/2006/main">
+  <p:cSld>
+    <p:spTree>
+      <p:nvGrpSpPr>
+        <p:cNvPr id="1" name=""/>
+        <p:cNvGrpSpPr/>
+        <p:nvPr/>
+      </p:nvGrpSpPr>
+      <p:grpSpPr>
+        <a:xfrm>
+          <a:off x="0" y="0"/>
+          <a:ext cx="0" cy="0"/>
+          <a:chOff x="0" y="0"/>
+          <a:chExt cx="0" cy="0"/>
+        </a:xfrm>
+      </p:grpSpPr>
+      <p:sp>
+        <p:nvSpPr>
+          <p:cNvPr id="2" name="Title 1">
+            <a:extLst>
+              <a:ext uri="{FF2B5EF4-FFF2-40B4-BE49-F238E27FC236}">
                 <a16:creationId xmlns:a16="http://schemas.microsoft.com/office/drawing/2014/main" id="{9866785D-DA7F-A128-04EF-DAFD14CD4FCA}"/>
               </a:ext>
             </a:extLst>
@@ -9107,7 +9317,7 @@
 </p:sld>
 </file>
 
-<file path=ppt/slides/slide4.xml><?xml version="1.0" encoding="utf-8"?>
+<file path=ppt/slides/slide5.xml><?xml version="1.0" encoding="utf-8"?>
 <p:sld xmlns:a="http://schemas.openxmlformats.org/drawingml/2006/main" xmlns:r="http://schemas.openxmlformats.org/officeDocument/2006/relationships" xmlns:p="http://schemas.openxmlformats.org/presentationml/2006/main">
   <p:cSld>
     <p:spTree>
@@ -9286,7 +9496,7 @@
 </p:sld>
 </file>
 
-<file path=ppt/slides/slide5.xml><?xml version="1.0" encoding="utf-8"?>
+<file path=ppt/slides/slide6.xml><?xml version="1.0" encoding="utf-8"?>
 <p:sld xmlns:a="http://schemas.openxmlformats.org/drawingml/2006/main" xmlns:r="http://schemas.openxmlformats.org/officeDocument/2006/relationships" xmlns:p="http://schemas.openxmlformats.org/presentationml/2006/main">
   <p:cSld>
     <p:spTree>
@@ -9514,7 +9724,7 @@
 </p:sld>
 </file>
 
-<file path=ppt/slides/slide6.xml><?xml version="1.0" encoding="utf-8"?>
+<file path=ppt/slides/slide7.xml><?xml version="1.0" encoding="utf-8"?>
 <p:sld xmlns:a="http://schemas.openxmlformats.org/drawingml/2006/main" xmlns:r="http://schemas.openxmlformats.org/officeDocument/2006/relationships" xmlns:p="http://schemas.openxmlformats.org/presentationml/2006/main">
   <p:cSld>
     <p:spTree>
@@ -9865,106 +10075,6 @@
 </p:sld>
 </file>
 
-<file path=ppt/slides/slide7.xml><?xml version="1.0" encoding="utf-8"?>
-<p:sld xmlns:a="http://schemas.openxmlformats.org/drawingml/2006/main" xmlns:r="http://schemas.openxmlformats.org/officeDocument/2006/relationships" xmlns:p="http://schemas.openxmlformats.org/presentationml/2006/main">
-  <p:cSld>
-    <p:spTree>
-      <p:nvGrpSpPr>
-        <p:cNvPr id="1" name=""/>
-        <p:cNvGrpSpPr/>
-        <p:nvPr/>
-      </p:nvGrpSpPr>
-      <p:grpSpPr>
-        <a:xfrm>
-          <a:off x="0" y="0"/>
-          <a:ext cx="0" cy="0"/>
-          <a:chOff x="0" y="0"/>
-          <a:chExt cx="0" cy="0"/>
-        </a:xfrm>
-      </p:grpSpPr>
-      <p:sp>
-        <p:nvSpPr>
-          <p:cNvPr id="2" name="Title 1">
-            <a:extLst>
-              <a:ext uri="{FF2B5EF4-FFF2-40B4-BE49-F238E27FC236}">
-                <a16:creationId xmlns:a16="http://schemas.microsoft.com/office/drawing/2014/main" id="{529DD758-A46C-5C72-32FE-FFE673AD30B9}"/>
-              </a:ext>
-            </a:extLst>
-          </p:cNvPr>
-          <p:cNvSpPr>
-            <a:spLocks noGrp="1"/>
-          </p:cNvSpPr>
-          <p:nvPr>
-            <p:ph type="title"/>
-          </p:nvPr>
-        </p:nvSpPr>
-        <p:spPr/>
-        <p:txBody>
-          <a:bodyPr/>
-          <a:lstStyle/>
-          <a:p>
-            <a:r>
-              <a:rPr lang="en-FI" dirty="0"/>
-              <a:t>Response</a:t>
-            </a:r>
-          </a:p>
-        </p:txBody>
-      </p:sp>
-      <p:sp>
-        <p:nvSpPr>
-          <p:cNvPr id="3" name="Content Placeholder 2">
-            <a:extLst>
-              <a:ext uri="{FF2B5EF4-FFF2-40B4-BE49-F238E27FC236}">
-                <a16:creationId xmlns:a16="http://schemas.microsoft.com/office/drawing/2014/main" id="{D0750611-12CD-075C-EE77-126EC04FB19A}"/>
-              </a:ext>
-            </a:extLst>
-          </p:cNvPr>
-          <p:cNvSpPr>
-            <a:spLocks noGrp="1"/>
-          </p:cNvSpPr>
-          <p:nvPr>
-            <p:ph idx="1"/>
-          </p:nvPr>
-        </p:nvSpPr>
-        <p:spPr/>
-        <p:txBody>
-          <a:bodyPr/>
-          <a:lstStyle/>
-          <a:p>
-            <a:pPr marL="0" indent="0">
-              <a:buFont typeface="Arial" panose="020B0604020202020204" pitchFamily="34" charset="0"/>
-              <a:buNone/>
-            </a:pPr>
-            <a:r>
-              <a:rPr lang="en-FI" dirty="0"/>
-              <a:t>Headers</a:t>
-            </a:r>
-          </a:p>
-          <a:p>
-            <a:pPr marL="0" indent="0">
-              <a:buFont typeface="Arial" panose="020B0604020202020204" pitchFamily="34" charset="0"/>
-              <a:buNone/>
-            </a:pPr>
-            <a:r>
-              <a:rPr lang="en-FI" dirty="0"/>
-              <a:t>Body</a:t>
-            </a:r>
-          </a:p>
-        </p:txBody>
-      </p:sp>
-    </p:spTree>
-    <p:extLst>
-      <p:ext uri="{BB962C8B-B14F-4D97-AF65-F5344CB8AC3E}">
-        <p14:creationId xmlns:p14="http://schemas.microsoft.com/office/powerpoint/2010/main" val="184955105"/>
-      </p:ext>
-    </p:extLst>
-  </p:cSld>
-  <p:clrMapOvr>
-    <a:masterClrMapping/>
-  </p:clrMapOvr>
-</p:sld>
-</file>
-
 <file path=ppt/slides/slide8.xml><?xml version="1.0" encoding="utf-8"?>
 <p:sld xmlns:a="http://schemas.openxmlformats.org/drawingml/2006/main" xmlns:r="http://schemas.openxmlformats.org/officeDocument/2006/relationships" xmlns:p="http://schemas.openxmlformats.org/presentationml/2006/main">
   <p:cSld>
@@ -9987,7 +10097,7 @@
           <p:cNvPr id="2" name="Title 1">
             <a:extLst>
               <a:ext uri="{FF2B5EF4-FFF2-40B4-BE49-F238E27FC236}">
-                <a16:creationId xmlns:a16="http://schemas.microsoft.com/office/drawing/2014/main" id="{C4DA0947-2F29-91A0-C7FE-10DB9D900F72}"/>
+                <a16:creationId xmlns:a16="http://schemas.microsoft.com/office/drawing/2014/main" id="{529DD758-A46C-5C72-32FE-FFE673AD30B9}"/>
               </a:ext>
             </a:extLst>
           </p:cNvPr>
@@ -10005,7 +10115,49 @@
           <a:p>
             <a:r>
               <a:rPr lang="en-FI" dirty="0"/>
-              <a:t>Example</a:t>
+              <a:t>Response</a:t>
+            </a:r>
+          </a:p>
+        </p:txBody>
+      </p:sp>
+      <p:sp>
+        <p:nvSpPr>
+          <p:cNvPr id="3" name="Content Placeholder 2">
+            <a:extLst>
+              <a:ext uri="{FF2B5EF4-FFF2-40B4-BE49-F238E27FC236}">
+                <a16:creationId xmlns:a16="http://schemas.microsoft.com/office/drawing/2014/main" id="{D0750611-12CD-075C-EE77-126EC04FB19A}"/>
+              </a:ext>
+            </a:extLst>
+          </p:cNvPr>
+          <p:cNvSpPr>
+            <a:spLocks noGrp="1"/>
+          </p:cNvSpPr>
+          <p:nvPr>
+            <p:ph idx="1"/>
+          </p:nvPr>
+        </p:nvSpPr>
+        <p:spPr/>
+        <p:txBody>
+          <a:bodyPr/>
+          <a:lstStyle/>
+          <a:p>
+            <a:pPr marL="0" indent="0">
+              <a:buFont typeface="Arial" panose="020B0604020202020204" pitchFamily="34" charset="0"/>
+              <a:buNone/>
+            </a:pPr>
+            <a:r>
+              <a:rPr lang="en-FI" dirty="0"/>
+              <a:t>Headers</a:t>
+            </a:r>
+          </a:p>
+          <a:p>
+            <a:pPr marL="0" indent="0">
+              <a:buFont typeface="Arial" panose="020B0604020202020204" pitchFamily="34" charset="0"/>
+              <a:buNone/>
+            </a:pPr>
+            <a:r>
+              <a:rPr lang="en-FI" dirty="0"/>
+              <a:t>Body</a:t>
             </a:r>
           </a:p>
         </p:txBody>
@@ -10013,7 +10165,7 @@
     </p:spTree>
     <p:extLst>
       <p:ext uri="{BB962C8B-B14F-4D97-AF65-F5344CB8AC3E}">
-        <p14:creationId xmlns:p14="http://schemas.microsoft.com/office/powerpoint/2010/main" val="2244153434"/>
+        <p14:creationId xmlns:p14="http://schemas.microsoft.com/office/powerpoint/2010/main" val="184955105"/>
       </p:ext>
     </p:extLst>
   </p:cSld>
@@ -10045,7 +10197,7 @@
           <p:cNvPr id="2" name="Title 1">
             <a:extLst>
               <a:ext uri="{FF2B5EF4-FFF2-40B4-BE49-F238E27FC236}">
-                <a16:creationId xmlns:a16="http://schemas.microsoft.com/office/drawing/2014/main" id="{6854363E-2AE7-A48F-12CB-9F0FBECDE775}"/>
+                <a16:creationId xmlns:a16="http://schemas.microsoft.com/office/drawing/2014/main" id="{C4DA0947-2F29-91A0-C7FE-10DB9D900F72}"/>
               </a:ext>
             </a:extLst>
           </p:cNvPr>
@@ -10063,59 +10215,7 @@
           <a:p>
             <a:r>
               <a:rPr lang="en-FI" dirty="0"/>
-              <a:t>Response formats</a:t>
-            </a:r>
-          </a:p>
-        </p:txBody>
-      </p:sp>
-      <p:sp>
-        <p:nvSpPr>
-          <p:cNvPr id="3" name="Content Placeholder 2">
-            <a:extLst>
-              <a:ext uri="{FF2B5EF4-FFF2-40B4-BE49-F238E27FC236}">
-                <a16:creationId xmlns:a16="http://schemas.microsoft.com/office/drawing/2014/main" id="{BEAD65EC-F7A5-101B-F898-2C29DD9B344C}"/>
-              </a:ext>
-            </a:extLst>
-          </p:cNvPr>
-          <p:cNvSpPr>
-            <a:spLocks noGrp="1"/>
-          </p:cNvSpPr>
-          <p:nvPr>
-            <p:ph idx="1"/>
-          </p:nvPr>
-        </p:nvSpPr>
-        <p:spPr/>
-        <p:txBody>
-          <a:bodyPr/>
-          <a:lstStyle/>
-          <a:p>
-            <a:r>
-              <a:rPr lang="en-FI" dirty="0"/>
-              <a:t>Raw text</a:t>
-            </a:r>
-          </a:p>
-          <a:p>
-            <a:r>
-              <a:rPr lang="en-FI" dirty="0"/>
-              <a:t>HTML/XML</a:t>
-            </a:r>
-          </a:p>
-          <a:p>
-            <a:r>
-              <a:rPr lang="en-FI" dirty="0"/>
-              <a:t>JSON</a:t>
-            </a:r>
-          </a:p>
-          <a:p>
-            <a:r>
-              <a:rPr lang="en-FI" dirty="0"/>
-              <a:t>Image</a:t>
-            </a:r>
-          </a:p>
-          <a:p>
-            <a:r>
-              <a:rPr lang="en-FI" dirty="0"/>
-              <a:t>File</a:t>
+              <a:t>Example</a:t>
             </a:r>
           </a:p>
         </p:txBody>
@@ -10123,7 +10223,7 @@
     </p:spTree>
     <p:extLst>
       <p:ext uri="{BB962C8B-B14F-4D97-AF65-F5344CB8AC3E}">
-        <p14:creationId xmlns:p14="http://schemas.microsoft.com/office/powerpoint/2010/main" val="2420404371"/>
+        <p14:creationId xmlns:p14="http://schemas.microsoft.com/office/powerpoint/2010/main" val="2244153434"/>
       </p:ext>
     </p:extLst>
   </p:cSld>

</xml_diff>